<commit_message>
Presentation - more update
</commit_message>
<xml_diff>
--- a/Project Documentation/Presentation Mandarine.pptx
+++ b/Project Documentation/Presentation Mandarine.pptx
@@ -369,7 +369,7 @@
     </p:spTree>
     <p:extLst>
       <p:ext uri="{BB962C8B-B14F-4D97-AF65-F5344CB8AC3E}">
-        <p14:creationId xmlns:p14="http://schemas.microsoft.com/office/powerpoint/2010/main" xmlns="" val="3915967036"/>
+        <p14:creationId xmlns="" xmlns:p14="http://schemas.microsoft.com/office/powerpoint/2010/main" val="3915967036"/>
       </p:ext>
     </p:extLst>
   </p:cSld>
@@ -544,7 +544,7 @@
     </p:spTree>
     <p:extLst>
       <p:ext uri="{BB962C8B-B14F-4D97-AF65-F5344CB8AC3E}">
-        <p14:creationId xmlns:p14="http://schemas.microsoft.com/office/powerpoint/2010/main" xmlns="" val="379079075"/>
+        <p14:creationId xmlns="" xmlns:p14="http://schemas.microsoft.com/office/powerpoint/2010/main" val="379079075"/>
       </p:ext>
     </p:extLst>
   </p:cSld>
@@ -629,7 +629,7 @@
     </p:spTree>
     <p:extLst>
       <p:ext uri="{BB962C8B-B14F-4D97-AF65-F5344CB8AC3E}">
-        <p14:creationId xmlns:p14="http://schemas.microsoft.com/office/powerpoint/2010/main" xmlns="" val="2747109784"/>
+        <p14:creationId xmlns="" xmlns:p14="http://schemas.microsoft.com/office/powerpoint/2010/main" val="2747109784"/>
       </p:ext>
     </p:extLst>
   </p:cSld>
@@ -873,7 +873,7 @@
     </p:spTree>
     <p:extLst>
       <p:ext uri="{BB962C8B-B14F-4D97-AF65-F5344CB8AC3E}">
-        <p14:creationId xmlns:p14="http://schemas.microsoft.com/office/powerpoint/2010/main" xmlns="" val="1365601116"/>
+        <p14:creationId xmlns="" xmlns:p14="http://schemas.microsoft.com/office/powerpoint/2010/main" val="1365601116"/>
       </p:ext>
     </p:extLst>
   </p:cSld>
@@ -1045,7 +1045,7 @@
     </p:spTree>
     <p:extLst>
       <p:ext uri="{BB962C8B-B14F-4D97-AF65-F5344CB8AC3E}">
-        <p14:creationId xmlns:p14="http://schemas.microsoft.com/office/powerpoint/2010/main" xmlns="" val="2307113976"/>
+        <p14:creationId xmlns="" xmlns:p14="http://schemas.microsoft.com/office/powerpoint/2010/main" val="2307113976"/>
       </p:ext>
     </p:extLst>
   </p:cSld>
@@ -1227,7 +1227,7 @@
     </p:spTree>
     <p:extLst>
       <p:ext uri="{BB962C8B-B14F-4D97-AF65-F5344CB8AC3E}">
-        <p14:creationId xmlns:p14="http://schemas.microsoft.com/office/powerpoint/2010/main" xmlns="" val="2924712174"/>
+        <p14:creationId xmlns="" xmlns:p14="http://schemas.microsoft.com/office/powerpoint/2010/main" val="2924712174"/>
       </p:ext>
     </p:extLst>
   </p:cSld>
@@ -1399,7 +1399,7 @@
     </p:spTree>
     <p:extLst>
       <p:ext uri="{BB962C8B-B14F-4D97-AF65-F5344CB8AC3E}">
-        <p14:creationId xmlns:p14="http://schemas.microsoft.com/office/powerpoint/2010/main" xmlns="" val="920667919"/>
+        <p14:creationId xmlns="" xmlns:p14="http://schemas.microsoft.com/office/powerpoint/2010/main" val="920667919"/>
       </p:ext>
     </p:extLst>
   </p:cSld>
@@ -1647,7 +1647,7 @@
     </p:spTree>
     <p:extLst>
       <p:ext uri="{BB962C8B-B14F-4D97-AF65-F5344CB8AC3E}">
-        <p14:creationId xmlns:p14="http://schemas.microsoft.com/office/powerpoint/2010/main" xmlns="" val="2518805200"/>
+        <p14:creationId xmlns="" xmlns:p14="http://schemas.microsoft.com/office/powerpoint/2010/main" val="2518805200"/>
       </p:ext>
     </p:extLst>
   </p:cSld>
@@ -1937,7 +1937,7 @@
     </p:spTree>
     <p:extLst>
       <p:ext uri="{BB962C8B-B14F-4D97-AF65-F5344CB8AC3E}">
-        <p14:creationId xmlns:p14="http://schemas.microsoft.com/office/powerpoint/2010/main" xmlns="" val="1671547278"/>
+        <p14:creationId xmlns="" xmlns:p14="http://schemas.microsoft.com/office/powerpoint/2010/main" val="1671547278"/>
       </p:ext>
     </p:extLst>
   </p:cSld>
@@ -2361,7 +2361,7 @@
     </p:spTree>
     <p:extLst>
       <p:ext uri="{BB962C8B-B14F-4D97-AF65-F5344CB8AC3E}">
-        <p14:creationId xmlns:p14="http://schemas.microsoft.com/office/powerpoint/2010/main" xmlns="" val="2359131444"/>
+        <p14:creationId xmlns="" xmlns:p14="http://schemas.microsoft.com/office/powerpoint/2010/main" val="2359131444"/>
       </p:ext>
     </p:extLst>
   </p:cSld>
@@ -2481,7 +2481,7 @@
     </p:spTree>
     <p:extLst>
       <p:ext uri="{BB962C8B-B14F-4D97-AF65-F5344CB8AC3E}">
-        <p14:creationId xmlns:p14="http://schemas.microsoft.com/office/powerpoint/2010/main" xmlns="" val="1701070066"/>
+        <p14:creationId xmlns="" xmlns:p14="http://schemas.microsoft.com/office/powerpoint/2010/main" val="1701070066"/>
       </p:ext>
     </p:extLst>
   </p:cSld>
@@ -2578,7 +2578,7 @@
     </p:spTree>
     <p:extLst>
       <p:ext uri="{BB962C8B-B14F-4D97-AF65-F5344CB8AC3E}">
-        <p14:creationId xmlns:p14="http://schemas.microsoft.com/office/powerpoint/2010/main" xmlns="" val="1206239005"/>
+        <p14:creationId xmlns="" xmlns:p14="http://schemas.microsoft.com/office/powerpoint/2010/main" val="1206239005"/>
       </p:ext>
     </p:extLst>
   </p:cSld>
@@ -2857,7 +2857,7 @@
     </p:spTree>
     <p:extLst>
       <p:ext uri="{BB962C8B-B14F-4D97-AF65-F5344CB8AC3E}">
-        <p14:creationId xmlns:p14="http://schemas.microsoft.com/office/powerpoint/2010/main" xmlns="" val="2089640843"/>
+        <p14:creationId xmlns="" xmlns:p14="http://schemas.microsoft.com/office/powerpoint/2010/main" val="2089640843"/>
       </p:ext>
     </p:extLst>
   </p:cSld>
@@ -3112,7 +3112,7 @@
     </p:spTree>
     <p:extLst>
       <p:ext uri="{BB962C8B-B14F-4D97-AF65-F5344CB8AC3E}">
-        <p14:creationId xmlns:p14="http://schemas.microsoft.com/office/powerpoint/2010/main" xmlns="" val="1915928661"/>
+        <p14:creationId xmlns="" xmlns:p14="http://schemas.microsoft.com/office/powerpoint/2010/main" val="1915928661"/>
       </p:ext>
     </p:extLst>
   </p:cSld>
@@ -3372,7 +3372,7 @@
     </p:spTree>
     <p:extLst>
       <p:ext uri="{BB962C8B-B14F-4D97-AF65-F5344CB8AC3E}">
-        <p14:creationId xmlns:p14="http://schemas.microsoft.com/office/powerpoint/2010/main" xmlns="" val="3313188243"/>
+        <p14:creationId xmlns="" xmlns:p14="http://schemas.microsoft.com/office/powerpoint/2010/main" val="3313188243"/>
       </p:ext>
     </p:extLst>
   </p:cSld>
@@ -3990,7 +3990,7 @@
     </p:spTree>
     <p:extLst>
       <p:ext uri="{BB962C8B-B14F-4D97-AF65-F5344CB8AC3E}">
-        <p14:creationId xmlns:p14="http://schemas.microsoft.com/office/powerpoint/2010/main" xmlns="" val="3556372192"/>
+        <p14:creationId xmlns="" xmlns:p14="http://schemas.microsoft.com/office/powerpoint/2010/main" val="3556372192"/>
       </p:ext>
     </p:extLst>
   </p:cSld>
@@ -4277,7 +4277,7 @@
           <p:nvPr>
             <p:extLst>
               <p:ext uri="{D42A27DB-BD31-4B8C-83A1-F6EECF244321}">
-                <p14:modId xmlns:p14="http://schemas.microsoft.com/office/powerpoint/2010/main" xmlns="" val="193443960"/>
+                <p14:modId xmlns="" xmlns:p14="http://schemas.microsoft.com/office/powerpoint/2010/main" val="193443960"/>
               </p:ext>
             </p:extLst>
           </p:nvPr>
@@ -4724,7 +4724,7 @@
     </p:spTree>
     <p:extLst>
       <p:ext uri="{BB962C8B-B14F-4D97-AF65-F5344CB8AC3E}">
-        <p14:creationId xmlns:p14="http://schemas.microsoft.com/office/powerpoint/2010/main" xmlns="" val="3929209132"/>
+        <p14:creationId xmlns="" xmlns:p14="http://schemas.microsoft.com/office/powerpoint/2010/main" val="3929209132"/>
       </p:ext>
     </p:extLst>
   </p:cSld>
@@ -5086,7 +5086,7 @@
     </p:spTree>
     <p:extLst>
       <p:ext uri="{BB962C8B-B14F-4D97-AF65-F5344CB8AC3E}">
-        <p14:creationId xmlns:p14="http://schemas.microsoft.com/office/powerpoint/2010/main" xmlns="" val="4207131649"/>
+        <p14:creationId xmlns="" xmlns:p14="http://schemas.microsoft.com/office/powerpoint/2010/main" val="4207131649"/>
       </p:ext>
     </p:extLst>
   </p:cSld>
@@ -5324,7 +5324,7 @@
     </p:spTree>
     <p:extLst>
       <p:ext uri="{BB962C8B-B14F-4D97-AF65-F5344CB8AC3E}">
-        <p14:creationId xmlns:p14="http://schemas.microsoft.com/office/powerpoint/2010/main" xmlns="" val="1978140734"/>
+        <p14:creationId xmlns="" xmlns:p14="http://schemas.microsoft.com/office/powerpoint/2010/main" val="1978140734"/>
       </p:ext>
     </p:extLst>
   </p:cSld>
@@ -5649,7 +5649,7 @@
                     <a:lstStyle/>
                     <a:p>
                       <a:r>
-                        <a:rPr lang="en-US" sz="1800" b="0" i="0" kern="1200" dirty="0" smtClean="0">
+                        <a:rPr lang="en-US" sz="1800" b="0" i="0" kern="1200" dirty="0" err="1" smtClean="0">
                           <a:solidFill>
                             <a:schemeClr val="dk1"/>
                           </a:solidFill>
@@ -5657,7 +5657,7 @@
                           <a:ea typeface="+mn-ea"/>
                           <a:cs typeface="+mn-cs"/>
                         </a:rPr>
-                        <a:t>Canvas</a:t>
+                        <a:t>CanvasJS</a:t>
                       </a:r>
                       <a:r>
                         <a:rPr lang="en-US" sz="1800" b="0" i="0" kern="1200" baseline="0" dirty="0" smtClean="0">
@@ -5668,7 +5668,7 @@
                           <a:ea typeface="+mn-ea"/>
                           <a:cs typeface="+mn-cs"/>
                         </a:rPr>
-                        <a:t>     </a:t>
+                        <a:t>  </a:t>
                       </a:r>
                       <a:r>
                         <a:rPr lang="en-US" sz="1800" b="0" i="0" kern="1200" dirty="0" err="1" smtClean="0">
@@ -6120,7 +6120,7 @@
     </p:spTree>
     <p:extLst>
       <p:ext uri="{BB962C8B-B14F-4D97-AF65-F5344CB8AC3E}">
-        <p14:creationId xmlns:p14="http://schemas.microsoft.com/office/powerpoint/2010/main" xmlns="" val="1284655973"/>
+        <p14:creationId xmlns="" xmlns:p14="http://schemas.microsoft.com/office/powerpoint/2010/main" val="1284655973"/>
       </p:ext>
     </p:extLst>
   </p:cSld>
@@ -6479,7 +6479,7 @@
     </p:spTree>
     <p:extLst>
       <p:ext uri="{BB962C8B-B14F-4D97-AF65-F5344CB8AC3E}">
-        <p14:creationId xmlns:p14="http://schemas.microsoft.com/office/powerpoint/2010/main" xmlns="" val="3004571794"/>
+        <p14:creationId xmlns="" xmlns:p14="http://schemas.microsoft.com/office/powerpoint/2010/main" val="3004571794"/>
       </p:ext>
     </p:extLst>
   </p:cSld>
@@ -6636,27 +6636,47 @@
                   </a:schemeClr>
                 </a:solidFill>
               </a:rPr>
-              <a:t>Use of </a:t>
-            </a:r>
-            <a:r>
-              <a:rPr lang="en-US" sz="2400" dirty="0" err="1" smtClean="0">
+              <a:t>Use </a:t>
+            </a:r>
+            <a:r>
+              <a:rPr lang="en-US" sz="2400" dirty="0" smtClean="0">
                 <a:solidFill>
                   <a:schemeClr val="accent1">
                     <a:lumMod val="50000"/>
                   </a:schemeClr>
                 </a:solidFill>
               </a:rPr>
-              <a:t>CanvasJS</a:t>
-            </a:r>
-            <a:r>
-              <a:rPr lang="en-US" sz="2400" dirty="0" smtClean="0">
+              <a:t>of  </a:t>
+            </a:r>
+            <a:r>
+              <a:rPr lang="en-US" sz="2400" dirty="0" err="1" smtClean="0">
                 <a:solidFill>
                   <a:schemeClr val="accent1">
                     <a:lumMod val="50000"/>
                   </a:schemeClr>
                 </a:solidFill>
               </a:rPr>
-              <a:t>,  framework like </a:t>
+              <a:t>CanvasJS</a:t>
+            </a:r>
+            <a:r>
+              <a:rPr lang="en-US" sz="2400" dirty="0" smtClean="0">
+                <a:solidFill>
+                  <a:schemeClr val="accent1">
+                    <a:lumMod val="50000"/>
+                  </a:schemeClr>
+                </a:solidFill>
+              </a:rPr>
+              <a:t>,  </a:t>
+            </a:r>
+            <a:r>
+              <a:rPr lang="en-US" sz="2400" dirty="0" smtClean="0">
+                <a:solidFill>
+                  <a:schemeClr val="accent1">
+                    <a:lumMod val="50000"/>
+                  </a:schemeClr>
+                </a:solidFill>
+              </a:rPr>
+              <a:t> </a:t>
             </a:r>
             <a:r>
               <a:rPr lang="en-US" sz="2400" dirty="0" err="1" smtClean="0">
@@ -6702,7 +6722,27 @@
                   </a:schemeClr>
                 </a:solidFill>
               </a:rPr>
-              <a:t>Use of SVG , Raphael JS , </a:t>
+              <a:t>Use of </a:t>
+            </a:r>
+            <a:r>
+              <a:rPr lang="en-US" sz="2400" dirty="0" smtClean="0">
+                <a:solidFill>
+                  <a:schemeClr val="accent1">
+                    <a:lumMod val="50000"/>
+                  </a:schemeClr>
+                </a:solidFill>
+              </a:rPr>
+              <a:t>Raphael </a:t>
+            </a:r>
+            <a:r>
+              <a:rPr lang="en-US" sz="2400" dirty="0" smtClean="0">
+                <a:solidFill>
+                  <a:schemeClr val="accent1">
+                    <a:lumMod val="50000"/>
+                  </a:schemeClr>
+                </a:solidFill>
+              </a:rPr>
+              <a:t>JS , </a:t>
             </a:r>
             <a:r>
               <a:rPr lang="en-US" sz="2400" dirty="0" err="1" smtClean="0">
@@ -6748,8 +6788,25 @@
                   </a:schemeClr>
                 </a:solidFill>
               </a:rPr>
-              <a:t>Created animation with SVG </a:t>
-            </a:r>
+              <a:t>Created animation with </a:t>
+            </a:r>
+            <a:r>
+              <a:rPr lang="en-US" sz="2400" dirty="0" smtClean="0">
+                <a:solidFill>
+                  <a:schemeClr val="accent1">
+                    <a:lumMod val="50000"/>
+                  </a:schemeClr>
+                </a:solidFill>
+              </a:rPr>
+              <a:t>Raphael JS</a:t>
+            </a:r>
+            <a:endParaRPr lang="en-US" sz="2400" dirty="0" smtClean="0">
+              <a:solidFill>
+                <a:schemeClr val="accent1">
+                  <a:lumMod val="50000"/>
+                </a:schemeClr>
+              </a:solidFill>
+            </a:endParaRPr>
           </a:p>
           <a:p>
             <a:pPr>
@@ -6792,7 +6849,7 @@
     </p:spTree>
     <p:extLst>
       <p:ext uri="{BB962C8B-B14F-4D97-AF65-F5344CB8AC3E}">
-        <p14:creationId xmlns:p14="http://schemas.microsoft.com/office/powerpoint/2010/main" xmlns="" val="241372775"/>
+        <p14:creationId xmlns="" xmlns:p14="http://schemas.microsoft.com/office/powerpoint/2010/main" val="241372775"/>
       </p:ext>
     </p:extLst>
   </p:cSld>
@@ -6913,7 +6970,7 @@
     </p:spTree>
     <p:extLst>
       <p:ext uri="{BB962C8B-B14F-4D97-AF65-F5344CB8AC3E}">
-        <p14:creationId xmlns:p14="http://schemas.microsoft.com/office/powerpoint/2010/main" xmlns="" val="2020875122"/>
+        <p14:creationId xmlns="" xmlns:p14="http://schemas.microsoft.com/office/powerpoint/2010/main" val="2020875122"/>
       </p:ext>
     </p:extLst>
   </p:cSld>

</xml_diff>

<commit_message>
Presentation add, Pyramid button is changed
</commit_message>
<xml_diff>
--- a/Project Documentation/Presentation Mandarine.pptx
+++ b/Project Documentation/Presentation Mandarine.pptx
@@ -369,7 +369,7 @@
     </p:spTree>
     <p:extLst>
       <p:ext uri="{BB962C8B-B14F-4D97-AF65-F5344CB8AC3E}">
-        <p14:creationId xmlns="" xmlns:p14="http://schemas.microsoft.com/office/powerpoint/2010/main" val="3915967036"/>
+        <p14:creationId xmlns:p14="http://schemas.microsoft.com/office/powerpoint/2010/main" xmlns="" val="3915967036"/>
       </p:ext>
     </p:extLst>
   </p:cSld>
@@ -544,7 +544,7 @@
     </p:spTree>
     <p:extLst>
       <p:ext uri="{BB962C8B-B14F-4D97-AF65-F5344CB8AC3E}">
-        <p14:creationId xmlns="" xmlns:p14="http://schemas.microsoft.com/office/powerpoint/2010/main" val="379079075"/>
+        <p14:creationId xmlns:p14="http://schemas.microsoft.com/office/powerpoint/2010/main" xmlns="" val="379079075"/>
       </p:ext>
     </p:extLst>
   </p:cSld>
@@ -629,7 +629,7 @@
     </p:spTree>
     <p:extLst>
       <p:ext uri="{BB962C8B-B14F-4D97-AF65-F5344CB8AC3E}">
-        <p14:creationId xmlns="" xmlns:p14="http://schemas.microsoft.com/office/powerpoint/2010/main" val="2747109784"/>
+        <p14:creationId xmlns:p14="http://schemas.microsoft.com/office/powerpoint/2010/main" xmlns="" val="2747109784"/>
       </p:ext>
     </p:extLst>
   </p:cSld>
@@ -873,7 +873,7 @@
     </p:spTree>
     <p:extLst>
       <p:ext uri="{BB962C8B-B14F-4D97-AF65-F5344CB8AC3E}">
-        <p14:creationId xmlns="" xmlns:p14="http://schemas.microsoft.com/office/powerpoint/2010/main" val="1365601116"/>
+        <p14:creationId xmlns:p14="http://schemas.microsoft.com/office/powerpoint/2010/main" xmlns="" val="1365601116"/>
       </p:ext>
     </p:extLst>
   </p:cSld>
@@ -1045,7 +1045,7 @@
     </p:spTree>
     <p:extLst>
       <p:ext uri="{BB962C8B-B14F-4D97-AF65-F5344CB8AC3E}">
-        <p14:creationId xmlns="" xmlns:p14="http://schemas.microsoft.com/office/powerpoint/2010/main" val="2307113976"/>
+        <p14:creationId xmlns:p14="http://schemas.microsoft.com/office/powerpoint/2010/main" xmlns="" val="2307113976"/>
       </p:ext>
     </p:extLst>
   </p:cSld>
@@ -1227,7 +1227,7 @@
     </p:spTree>
     <p:extLst>
       <p:ext uri="{BB962C8B-B14F-4D97-AF65-F5344CB8AC3E}">
-        <p14:creationId xmlns="" xmlns:p14="http://schemas.microsoft.com/office/powerpoint/2010/main" val="2924712174"/>
+        <p14:creationId xmlns:p14="http://schemas.microsoft.com/office/powerpoint/2010/main" xmlns="" val="2924712174"/>
       </p:ext>
     </p:extLst>
   </p:cSld>
@@ -1399,7 +1399,7 @@
     </p:spTree>
     <p:extLst>
       <p:ext uri="{BB962C8B-B14F-4D97-AF65-F5344CB8AC3E}">
-        <p14:creationId xmlns="" xmlns:p14="http://schemas.microsoft.com/office/powerpoint/2010/main" val="920667919"/>
+        <p14:creationId xmlns:p14="http://schemas.microsoft.com/office/powerpoint/2010/main" xmlns="" val="920667919"/>
       </p:ext>
     </p:extLst>
   </p:cSld>
@@ -1647,7 +1647,7 @@
     </p:spTree>
     <p:extLst>
       <p:ext uri="{BB962C8B-B14F-4D97-AF65-F5344CB8AC3E}">
-        <p14:creationId xmlns="" xmlns:p14="http://schemas.microsoft.com/office/powerpoint/2010/main" val="2518805200"/>
+        <p14:creationId xmlns:p14="http://schemas.microsoft.com/office/powerpoint/2010/main" xmlns="" val="2518805200"/>
       </p:ext>
     </p:extLst>
   </p:cSld>
@@ -1937,7 +1937,7 @@
     </p:spTree>
     <p:extLst>
       <p:ext uri="{BB962C8B-B14F-4D97-AF65-F5344CB8AC3E}">
-        <p14:creationId xmlns="" xmlns:p14="http://schemas.microsoft.com/office/powerpoint/2010/main" val="1671547278"/>
+        <p14:creationId xmlns:p14="http://schemas.microsoft.com/office/powerpoint/2010/main" xmlns="" val="1671547278"/>
       </p:ext>
     </p:extLst>
   </p:cSld>
@@ -2361,7 +2361,7 @@
     </p:spTree>
     <p:extLst>
       <p:ext uri="{BB962C8B-B14F-4D97-AF65-F5344CB8AC3E}">
-        <p14:creationId xmlns="" xmlns:p14="http://schemas.microsoft.com/office/powerpoint/2010/main" val="2359131444"/>
+        <p14:creationId xmlns:p14="http://schemas.microsoft.com/office/powerpoint/2010/main" xmlns="" val="2359131444"/>
       </p:ext>
     </p:extLst>
   </p:cSld>
@@ -2481,7 +2481,7 @@
     </p:spTree>
     <p:extLst>
       <p:ext uri="{BB962C8B-B14F-4D97-AF65-F5344CB8AC3E}">
-        <p14:creationId xmlns="" xmlns:p14="http://schemas.microsoft.com/office/powerpoint/2010/main" val="1701070066"/>
+        <p14:creationId xmlns:p14="http://schemas.microsoft.com/office/powerpoint/2010/main" xmlns="" val="1701070066"/>
       </p:ext>
     </p:extLst>
   </p:cSld>
@@ -2578,7 +2578,7 @@
     </p:spTree>
     <p:extLst>
       <p:ext uri="{BB962C8B-B14F-4D97-AF65-F5344CB8AC3E}">
-        <p14:creationId xmlns="" xmlns:p14="http://schemas.microsoft.com/office/powerpoint/2010/main" val="1206239005"/>
+        <p14:creationId xmlns:p14="http://schemas.microsoft.com/office/powerpoint/2010/main" xmlns="" val="1206239005"/>
       </p:ext>
     </p:extLst>
   </p:cSld>
@@ -2857,7 +2857,7 @@
     </p:spTree>
     <p:extLst>
       <p:ext uri="{BB962C8B-B14F-4D97-AF65-F5344CB8AC3E}">
-        <p14:creationId xmlns="" xmlns:p14="http://schemas.microsoft.com/office/powerpoint/2010/main" val="2089640843"/>
+        <p14:creationId xmlns:p14="http://schemas.microsoft.com/office/powerpoint/2010/main" xmlns="" val="2089640843"/>
       </p:ext>
     </p:extLst>
   </p:cSld>
@@ -3112,7 +3112,7 @@
     </p:spTree>
     <p:extLst>
       <p:ext uri="{BB962C8B-B14F-4D97-AF65-F5344CB8AC3E}">
-        <p14:creationId xmlns="" xmlns:p14="http://schemas.microsoft.com/office/powerpoint/2010/main" val="1915928661"/>
+        <p14:creationId xmlns:p14="http://schemas.microsoft.com/office/powerpoint/2010/main" xmlns="" val="1915928661"/>
       </p:ext>
     </p:extLst>
   </p:cSld>
@@ -3372,7 +3372,7 @@
     </p:spTree>
     <p:extLst>
       <p:ext uri="{BB962C8B-B14F-4D97-AF65-F5344CB8AC3E}">
-        <p14:creationId xmlns="" xmlns:p14="http://schemas.microsoft.com/office/powerpoint/2010/main" val="3313188243"/>
+        <p14:creationId xmlns:p14="http://schemas.microsoft.com/office/powerpoint/2010/main" xmlns="" val="3313188243"/>
       </p:ext>
     </p:extLst>
   </p:cSld>
@@ -3990,7 +3990,7 @@
     </p:spTree>
     <p:extLst>
       <p:ext uri="{BB962C8B-B14F-4D97-AF65-F5344CB8AC3E}">
-        <p14:creationId xmlns="" xmlns:p14="http://schemas.microsoft.com/office/powerpoint/2010/main" val="3556372192"/>
+        <p14:creationId xmlns:p14="http://schemas.microsoft.com/office/powerpoint/2010/main" xmlns="" val="3556372192"/>
       </p:ext>
     </p:extLst>
   </p:cSld>
@@ -4277,7 +4277,7 @@
           <p:nvPr>
             <p:extLst>
               <p:ext uri="{D42A27DB-BD31-4B8C-83A1-F6EECF244321}">
-                <p14:modId xmlns="" xmlns:p14="http://schemas.microsoft.com/office/powerpoint/2010/main" val="193443960"/>
+                <p14:modId xmlns:p14="http://schemas.microsoft.com/office/powerpoint/2010/main" xmlns="" val="193443960"/>
               </p:ext>
             </p:extLst>
           </p:nvPr>
@@ -4724,7 +4724,7 @@
     </p:spTree>
     <p:extLst>
       <p:ext uri="{BB962C8B-B14F-4D97-AF65-F5344CB8AC3E}">
-        <p14:creationId xmlns="" xmlns:p14="http://schemas.microsoft.com/office/powerpoint/2010/main" val="3929209132"/>
+        <p14:creationId xmlns:p14="http://schemas.microsoft.com/office/powerpoint/2010/main" xmlns="" val="3929209132"/>
       </p:ext>
     </p:extLst>
   </p:cSld>
@@ -5086,7 +5086,7 @@
     </p:spTree>
     <p:extLst>
       <p:ext uri="{BB962C8B-B14F-4D97-AF65-F5344CB8AC3E}">
-        <p14:creationId xmlns="" xmlns:p14="http://schemas.microsoft.com/office/powerpoint/2010/main" val="4207131649"/>
+        <p14:creationId xmlns:p14="http://schemas.microsoft.com/office/powerpoint/2010/main" xmlns="" val="4207131649"/>
       </p:ext>
     </p:extLst>
   </p:cSld>
@@ -5324,7 +5324,7 @@
     </p:spTree>
     <p:extLst>
       <p:ext uri="{BB962C8B-B14F-4D97-AF65-F5344CB8AC3E}">
-        <p14:creationId xmlns="" xmlns:p14="http://schemas.microsoft.com/office/powerpoint/2010/main" val="1978140734"/>
+        <p14:creationId xmlns:p14="http://schemas.microsoft.com/office/powerpoint/2010/main" xmlns="" val="1978140734"/>
       </p:ext>
     </p:extLst>
   </p:cSld>
@@ -5815,7 +5815,15 @@
                       </a:pPr>
                       <a:r>
                         <a:rPr lang="en-US" dirty="0" smtClean="0"/>
-                        <a:t>all factors, </a:t>
+                        <a:t>by</a:t>
+                      </a:r>
+                      <a:r>
+                        <a:rPr lang="en-US" baseline="0" dirty="0" smtClean="0"/>
+                        <a:t> rating</a:t>
+                      </a:r>
+                      <a:r>
+                        <a:rPr lang="en-US" dirty="0" smtClean="0"/>
+                        <a:t>, </a:t>
                       </a:r>
                       <a:r>
                         <a:rPr lang="en-US" baseline="0" dirty="0" smtClean="0"/>
@@ -6120,7 +6128,7 @@
     </p:spTree>
     <p:extLst>
       <p:ext uri="{BB962C8B-B14F-4D97-AF65-F5344CB8AC3E}">
-        <p14:creationId xmlns="" xmlns:p14="http://schemas.microsoft.com/office/powerpoint/2010/main" val="1284655973"/>
+        <p14:creationId xmlns:p14="http://schemas.microsoft.com/office/powerpoint/2010/main" xmlns="" val="1284655973"/>
       </p:ext>
     </p:extLst>
   </p:cSld>
@@ -6479,7 +6487,7 @@
     </p:spTree>
     <p:extLst>
       <p:ext uri="{BB962C8B-B14F-4D97-AF65-F5344CB8AC3E}">
-        <p14:creationId xmlns="" xmlns:p14="http://schemas.microsoft.com/office/powerpoint/2010/main" val="3004571794"/>
+        <p14:creationId xmlns:p14="http://schemas.microsoft.com/office/powerpoint/2010/main" xmlns="" val="3004571794"/>
       </p:ext>
     </p:extLst>
   </p:cSld>
@@ -6636,17 +6644,7 @@
                   </a:schemeClr>
                 </a:solidFill>
               </a:rPr>
-              <a:t>Use </a:t>
-            </a:r>
-            <a:r>
-              <a:rPr lang="en-US" sz="2400" dirty="0" smtClean="0">
-                <a:solidFill>
-                  <a:schemeClr val="accent1">
-                    <a:lumMod val="50000"/>
-                  </a:schemeClr>
-                </a:solidFill>
-              </a:rPr>
-              <a:t>of  </a:t>
+              <a:t>Use of  </a:t>
             </a:r>
             <a:r>
               <a:rPr lang="en-US" sz="2400" dirty="0" err="1" smtClean="0">
@@ -6666,17 +6664,7 @@
                   </a:schemeClr>
                 </a:solidFill>
               </a:rPr>
-              <a:t>,  </a:t>
-            </a:r>
-            <a:r>
-              <a:rPr lang="en-US" sz="2400" dirty="0" smtClean="0">
-                <a:solidFill>
-                  <a:schemeClr val="accent1">
-                    <a:lumMod val="50000"/>
-                  </a:schemeClr>
-                </a:solidFill>
-              </a:rPr>
-              <a:t> </a:t>
+              <a:t>,   </a:t>
             </a:r>
             <a:r>
               <a:rPr lang="en-US" sz="2400" dirty="0" err="1" smtClean="0">
@@ -6722,27 +6710,7 @@
                   </a:schemeClr>
                 </a:solidFill>
               </a:rPr>
-              <a:t>Use of </a:t>
-            </a:r>
-            <a:r>
-              <a:rPr lang="en-US" sz="2400" dirty="0" smtClean="0">
-                <a:solidFill>
-                  <a:schemeClr val="accent1">
-                    <a:lumMod val="50000"/>
-                  </a:schemeClr>
-                </a:solidFill>
-              </a:rPr>
-              <a:t>Raphael </a:t>
-            </a:r>
-            <a:r>
-              <a:rPr lang="en-US" sz="2400" dirty="0" smtClean="0">
-                <a:solidFill>
-                  <a:schemeClr val="accent1">
-                    <a:lumMod val="50000"/>
-                  </a:schemeClr>
-                </a:solidFill>
-              </a:rPr>
-              <a:t>JS , </a:t>
+              <a:t>Use of Raphael JS , </a:t>
             </a:r>
             <a:r>
               <a:rPr lang="en-US" sz="2400" dirty="0" err="1" smtClean="0">
@@ -6788,25 +6756,8 @@
                   </a:schemeClr>
                 </a:solidFill>
               </a:rPr>
-              <a:t>Created animation with </a:t>
-            </a:r>
-            <a:r>
-              <a:rPr lang="en-US" sz="2400" dirty="0" smtClean="0">
-                <a:solidFill>
-                  <a:schemeClr val="accent1">
-                    <a:lumMod val="50000"/>
-                  </a:schemeClr>
-                </a:solidFill>
-              </a:rPr>
-              <a:t>Raphael JS</a:t>
-            </a:r>
-            <a:endParaRPr lang="en-US" sz="2400" dirty="0" smtClean="0">
-              <a:solidFill>
-                <a:schemeClr val="accent1">
-                  <a:lumMod val="50000"/>
-                </a:schemeClr>
-              </a:solidFill>
-            </a:endParaRPr>
+              <a:t>Created animation with Raphael JS</a:t>
+            </a:r>
           </a:p>
           <a:p>
             <a:pPr>
@@ -6849,7 +6800,7 @@
     </p:spTree>
     <p:extLst>
       <p:ext uri="{BB962C8B-B14F-4D97-AF65-F5344CB8AC3E}">
-        <p14:creationId xmlns="" xmlns:p14="http://schemas.microsoft.com/office/powerpoint/2010/main" val="241372775"/>
+        <p14:creationId xmlns:p14="http://schemas.microsoft.com/office/powerpoint/2010/main" xmlns="" val="241372775"/>
       </p:ext>
     </p:extLst>
   </p:cSld>
@@ -6970,7 +6921,7 @@
     </p:spTree>
     <p:extLst>
       <p:ext uri="{BB962C8B-B14F-4D97-AF65-F5344CB8AC3E}">
-        <p14:creationId xmlns="" xmlns:p14="http://schemas.microsoft.com/office/powerpoint/2010/main" val="2020875122"/>
+        <p14:creationId xmlns:p14="http://schemas.microsoft.com/office/powerpoint/2010/main" xmlns="" val="2020875122"/>
       </p:ext>
     </p:extLst>
   </p:cSld>

</xml_diff>

<commit_message>
Documentation is now added + presentation change
</commit_message>
<xml_diff>
--- a/Project Documentation/Presentation Mandarine.pptx
+++ b/Project Documentation/Presentation Mandarine.pptx
@@ -369,7 +369,7 @@
     </p:spTree>
     <p:extLst>
       <p:ext uri="{BB962C8B-B14F-4D97-AF65-F5344CB8AC3E}">
-        <p14:creationId xmlns:p14="http://schemas.microsoft.com/office/powerpoint/2010/main" xmlns="" val="3915967036"/>
+        <p14:creationId xmlns="" xmlns:p14="http://schemas.microsoft.com/office/powerpoint/2010/main" val="3915967036"/>
       </p:ext>
     </p:extLst>
   </p:cSld>
@@ -544,7 +544,7 @@
     </p:spTree>
     <p:extLst>
       <p:ext uri="{BB962C8B-B14F-4D97-AF65-F5344CB8AC3E}">
-        <p14:creationId xmlns:p14="http://schemas.microsoft.com/office/powerpoint/2010/main" xmlns="" val="379079075"/>
+        <p14:creationId xmlns="" xmlns:p14="http://schemas.microsoft.com/office/powerpoint/2010/main" val="379079075"/>
       </p:ext>
     </p:extLst>
   </p:cSld>
@@ -629,7 +629,7 @@
     </p:spTree>
     <p:extLst>
       <p:ext uri="{BB962C8B-B14F-4D97-AF65-F5344CB8AC3E}">
-        <p14:creationId xmlns:p14="http://schemas.microsoft.com/office/powerpoint/2010/main" xmlns="" val="2747109784"/>
+        <p14:creationId xmlns="" xmlns:p14="http://schemas.microsoft.com/office/powerpoint/2010/main" val="2747109784"/>
       </p:ext>
     </p:extLst>
   </p:cSld>
@@ -873,7 +873,7 @@
     </p:spTree>
     <p:extLst>
       <p:ext uri="{BB962C8B-B14F-4D97-AF65-F5344CB8AC3E}">
-        <p14:creationId xmlns:p14="http://schemas.microsoft.com/office/powerpoint/2010/main" xmlns="" val="1365601116"/>
+        <p14:creationId xmlns="" xmlns:p14="http://schemas.microsoft.com/office/powerpoint/2010/main" val="1365601116"/>
       </p:ext>
     </p:extLst>
   </p:cSld>
@@ -1045,7 +1045,7 @@
     </p:spTree>
     <p:extLst>
       <p:ext uri="{BB962C8B-B14F-4D97-AF65-F5344CB8AC3E}">
-        <p14:creationId xmlns:p14="http://schemas.microsoft.com/office/powerpoint/2010/main" xmlns="" val="2307113976"/>
+        <p14:creationId xmlns="" xmlns:p14="http://schemas.microsoft.com/office/powerpoint/2010/main" val="2307113976"/>
       </p:ext>
     </p:extLst>
   </p:cSld>
@@ -1227,7 +1227,7 @@
     </p:spTree>
     <p:extLst>
       <p:ext uri="{BB962C8B-B14F-4D97-AF65-F5344CB8AC3E}">
-        <p14:creationId xmlns:p14="http://schemas.microsoft.com/office/powerpoint/2010/main" xmlns="" val="2924712174"/>
+        <p14:creationId xmlns="" xmlns:p14="http://schemas.microsoft.com/office/powerpoint/2010/main" val="2924712174"/>
       </p:ext>
     </p:extLst>
   </p:cSld>
@@ -1399,7 +1399,7 @@
     </p:spTree>
     <p:extLst>
       <p:ext uri="{BB962C8B-B14F-4D97-AF65-F5344CB8AC3E}">
-        <p14:creationId xmlns:p14="http://schemas.microsoft.com/office/powerpoint/2010/main" xmlns="" val="920667919"/>
+        <p14:creationId xmlns="" xmlns:p14="http://schemas.microsoft.com/office/powerpoint/2010/main" val="920667919"/>
       </p:ext>
     </p:extLst>
   </p:cSld>
@@ -1647,7 +1647,7 @@
     </p:spTree>
     <p:extLst>
       <p:ext uri="{BB962C8B-B14F-4D97-AF65-F5344CB8AC3E}">
-        <p14:creationId xmlns:p14="http://schemas.microsoft.com/office/powerpoint/2010/main" xmlns="" val="2518805200"/>
+        <p14:creationId xmlns="" xmlns:p14="http://schemas.microsoft.com/office/powerpoint/2010/main" val="2518805200"/>
       </p:ext>
     </p:extLst>
   </p:cSld>
@@ -1937,7 +1937,7 @@
     </p:spTree>
     <p:extLst>
       <p:ext uri="{BB962C8B-B14F-4D97-AF65-F5344CB8AC3E}">
-        <p14:creationId xmlns:p14="http://schemas.microsoft.com/office/powerpoint/2010/main" xmlns="" val="1671547278"/>
+        <p14:creationId xmlns="" xmlns:p14="http://schemas.microsoft.com/office/powerpoint/2010/main" val="1671547278"/>
       </p:ext>
     </p:extLst>
   </p:cSld>
@@ -2361,7 +2361,7 @@
     </p:spTree>
     <p:extLst>
       <p:ext uri="{BB962C8B-B14F-4D97-AF65-F5344CB8AC3E}">
-        <p14:creationId xmlns:p14="http://schemas.microsoft.com/office/powerpoint/2010/main" xmlns="" val="2359131444"/>
+        <p14:creationId xmlns="" xmlns:p14="http://schemas.microsoft.com/office/powerpoint/2010/main" val="2359131444"/>
       </p:ext>
     </p:extLst>
   </p:cSld>
@@ -2481,7 +2481,7 @@
     </p:spTree>
     <p:extLst>
       <p:ext uri="{BB962C8B-B14F-4D97-AF65-F5344CB8AC3E}">
-        <p14:creationId xmlns:p14="http://schemas.microsoft.com/office/powerpoint/2010/main" xmlns="" val="1701070066"/>
+        <p14:creationId xmlns="" xmlns:p14="http://schemas.microsoft.com/office/powerpoint/2010/main" val="1701070066"/>
       </p:ext>
     </p:extLst>
   </p:cSld>
@@ -2578,7 +2578,7 @@
     </p:spTree>
     <p:extLst>
       <p:ext uri="{BB962C8B-B14F-4D97-AF65-F5344CB8AC3E}">
-        <p14:creationId xmlns:p14="http://schemas.microsoft.com/office/powerpoint/2010/main" xmlns="" val="1206239005"/>
+        <p14:creationId xmlns="" xmlns:p14="http://schemas.microsoft.com/office/powerpoint/2010/main" val="1206239005"/>
       </p:ext>
     </p:extLst>
   </p:cSld>
@@ -2857,7 +2857,7 @@
     </p:spTree>
     <p:extLst>
       <p:ext uri="{BB962C8B-B14F-4D97-AF65-F5344CB8AC3E}">
-        <p14:creationId xmlns:p14="http://schemas.microsoft.com/office/powerpoint/2010/main" xmlns="" val="2089640843"/>
+        <p14:creationId xmlns="" xmlns:p14="http://schemas.microsoft.com/office/powerpoint/2010/main" val="2089640843"/>
       </p:ext>
     </p:extLst>
   </p:cSld>
@@ -3112,7 +3112,7 @@
     </p:spTree>
     <p:extLst>
       <p:ext uri="{BB962C8B-B14F-4D97-AF65-F5344CB8AC3E}">
-        <p14:creationId xmlns:p14="http://schemas.microsoft.com/office/powerpoint/2010/main" xmlns="" val="1915928661"/>
+        <p14:creationId xmlns="" xmlns:p14="http://schemas.microsoft.com/office/powerpoint/2010/main" val="1915928661"/>
       </p:ext>
     </p:extLst>
   </p:cSld>
@@ -3372,7 +3372,7 @@
     </p:spTree>
     <p:extLst>
       <p:ext uri="{BB962C8B-B14F-4D97-AF65-F5344CB8AC3E}">
-        <p14:creationId xmlns:p14="http://schemas.microsoft.com/office/powerpoint/2010/main" xmlns="" val="3313188243"/>
+        <p14:creationId xmlns="" xmlns:p14="http://schemas.microsoft.com/office/powerpoint/2010/main" val="3313188243"/>
       </p:ext>
     </p:extLst>
   </p:cSld>
@@ -3990,7 +3990,7 @@
     </p:spTree>
     <p:extLst>
       <p:ext uri="{BB962C8B-B14F-4D97-AF65-F5344CB8AC3E}">
-        <p14:creationId xmlns:p14="http://schemas.microsoft.com/office/powerpoint/2010/main" xmlns="" val="3556372192"/>
+        <p14:creationId xmlns="" xmlns:p14="http://schemas.microsoft.com/office/powerpoint/2010/main" val="3556372192"/>
       </p:ext>
     </p:extLst>
   </p:cSld>
@@ -4277,7 +4277,7 @@
           <p:nvPr>
             <p:extLst>
               <p:ext uri="{D42A27DB-BD31-4B8C-83A1-F6EECF244321}">
-                <p14:modId xmlns:p14="http://schemas.microsoft.com/office/powerpoint/2010/main" xmlns="" val="193443960"/>
+                <p14:modId xmlns="" xmlns:p14="http://schemas.microsoft.com/office/powerpoint/2010/main" val="193443960"/>
               </p:ext>
             </p:extLst>
           </p:nvPr>
@@ -4724,7 +4724,7 @@
     </p:spTree>
     <p:extLst>
       <p:ext uri="{BB962C8B-B14F-4D97-AF65-F5344CB8AC3E}">
-        <p14:creationId xmlns:p14="http://schemas.microsoft.com/office/powerpoint/2010/main" xmlns="" val="3929209132"/>
+        <p14:creationId xmlns="" xmlns:p14="http://schemas.microsoft.com/office/powerpoint/2010/main" val="3929209132"/>
       </p:ext>
     </p:extLst>
   </p:cSld>
@@ -5086,7 +5086,7 @@
     </p:spTree>
     <p:extLst>
       <p:ext uri="{BB962C8B-B14F-4D97-AF65-F5344CB8AC3E}">
-        <p14:creationId xmlns:p14="http://schemas.microsoft.com/office/powerpoint/2010/main" xmlns="" val="4207131649"/>
+        <p14:creationId xmlns="" xmlns:p14="http://schemas.microsoft.com/office/powerpoint/2010/main" val="4207131649"/>
       </p:ext>
     </p:extLst>
   </p:cSld>
@@ -5171,7 +5171,7 @@
         <p:spPr>
           <a:xfrm>
             <a:off x="4929514" y="1752600"/>
-            <a:ext cx="4191000" cy="4955203"/>
+            <a:ext cx="4191000" cy="4678204"/>
           </a:xfrm>
           <a:prstGeom prst="rect">
             <a:avLst/>
@@ -5194,6 +5194,13 @@
               </a:rPr>
               <a:t>The app: </a:t>
             </a:r>
+            <a:endParaRPr lang="en-US" sz="2000" b="1" dirty="0" smtClean="0">
+              <a:solidFill>
+                <a:schemeClr val="accent1">
+                  <a:lumMod val="50000"/>
+                </a:schemeClr>
+              </a:solidFill>
+            </a:endParaRPr>
           </a:p>
           <a:p>
             <a:endParaRPr lang="en-US" sz="2000" dirty="0">
@@ -5215,82 +5222,108 @@
               </a:rPr>
               <a:t>Has 10 different charts </a:t>
             </a:r>
-          </a:p>
-          <a:p>
-            <a:endParaRPr lang="en-US" sz="2000" dirty="0">
+            <a:br>
+              <a:rPr lang="en-US" sz="2000" dirty="0" smtClean="0">
+                <a:solidFill>
+                  <a:schemeClr val="accent1">
+                    <a:lumMod val="50000"/>
+                  </a:schemeClr>
+                </a:solidFill>
+              </a:rPr>
+            </a:br>
+            <a:r>
+              <a:rPr lang="en-US" sz="2000" dirty="0" smtClean="0">
+                <a:solidFill>
+                  <a:schemeClr val="accent1">
+                    <a:lumMod val="50000"/>
+                  </a:schemeClr>
+                </a:solidFill>
+              </a:rPr>
+              <a:t>Has its own database with movies and at the moment</a:t>
+            </a:r>
+            <a:br>
+              <a:rPr lang="en-US" sz="2000" dirty="0" smtClean="0">
+                <a:solidFill>
+                  <a:schemeClr val="accent1">
+                    <a:lumMod val="50000"/>
+                  </a:schemeClr>
+                </a:solidFill>
+              </a:rPr>
+            </a:br>
+            <a:r>
+              <a:rPr lang="en-US" sz="2000" dirty="0" smtClean="0">
+                <a:solidFill>
+                  <a:schemeClr val="accent1">
+                    <a:lumMod val="50000"/>
+                  </a:schemeClr>
+                </a:solidFill>
+              </a:rPr>
+              <a:t>almost all of the charts can work with it </a:t>
+            </a:r>
+            <a:br>
+              <a:rPr lang="en-US" sz="2000" dirty="0" smtClean="0">
+                <a:solidFill>
+                  <a:schemeClr val="accent1">
+                    <a:lumMod val="50000"/>
+                  </a:schemeClr>
+                </a:solidFill>
+              </a:rPr>
+            </a:br>
+            <a:r>
+              <a:rPr lang="en-US" sz="2000" dirty="0" smtClean="0">
+                <a:solidFill>
+                  <a:schemeClr val="accent1">
+                    <a:lumMod val="50000"/>
+                  </a:schemeClr>
+                </a:solidFill>
+              </a:rPr>
+              <a:t>You can add a new movie with detailed info – name, genre, ticket price etc. and it’s added to the data base </a:t>
+            </a:r>
+            <a:br>
+              <a:rPr lang="en-US" sz="2000" dirty="0" smtClean="0">
+                <a:solidFill>
+                  <a:schemeClr val="accent1">
+                    <a:lumMod val="50000"/>
+                  </a:schemeClr>
+                </a:solidFill>
+              </a:rPr>
+            </a:br>
+            <a:r>
+              <a:rPr lang="en-US" sz="2000" dirty="0" smtClean="0">
+                <a:solidFill>
+                  <a:schemeClr val="accent1">
+                    <a:lumMod val="50000"/>
+                  </a:schemeClr>
+                </a:solidFill>
+              </a:rPr>
+              <a:t/>
+            </a:r>
+            <a:br>
+              <a:rPr lang="en-US" sz="2000" dirty="0" smtClean="0">
+                <a:solidFill>
+                  <a:schemeClr val="accent1">
+                    <a:lumMod val="50000"/>
+                  </a:schemeClr>
+                </a:solidFill>
+              </a:rPr>
+            </a:br>
+            <a:r>
+              <a:rPr lang="en-US" sz="2000" dirty="0" smtClean="0">
+                <a:solidFill>
+                  <a:schemeClr val="accent1">
+                    <a:lumMod val="50000"/>
+                  </a:schemeClr>
+                </a:solidFill>
+              </a:rPr>
+              <a:t>At the moment half of the charts work with the new movie</a:t>
+            </a:r>
+            <a:endParaRPr lang="en-US" dirty="0">
               <a:solidFill>
                 <a:schemeClr val="accent1">
                   <a:lumMod val="50000"/>
                 </a:schemeClr>
               </a:solidFill>
             </a:endParaRPr>
-          </a:p>
-          <a:p>
-            <a:r>
-              <a:rPr lang="en-US" sz="2000" dirty="0" smtClean="0">
-                <a:solidFill>
-                  <a:schemeClr val="accent1">
-                    <a:lumMod val="50000"/>
-                  </a:schemeClr>
-                </a:solidFill>
-              </a:rPr>
-              <a:t>Has its own database with movies and </a:t>
-            </a:r>
-          </a:p>
-          <a:p>
-            <a:r>
-              <a:rPr lang="en-US" sz="2000" dirty="0" smtClean="0">
-                <a:solidFill>
-                  <a:schemeClr val="accent1">
-                    <a:lumMod val="50000"/>
-                  </a:schemeClr>
-                </a:solidFill>
-              </a:rPr>
-              <a:t>almost all of the charts can work with it </a:t>
-            </a:r>
-            <a:endParaRPr lang="en-US" sz="2000" dirty="0">
-              <a:solidFill>
-                <a:schemeClr val="accent1">
-                  <a:lumMod val="50000"/>
-                </a:schemeClr>
-              </a:solidFill>
-            </a:endParaRPr>
-          </a:p>
-          <a:p>
-            <a:r>
-              <a:rPr lang="en-US" sz="2000" dirty="0" smtClean="0">
-                <a:solidFill>
-                  <a:schemeClr val="accent1">
-                    <a:lumMod val="50000"/>
-                  </a:schemeClr>
-                </a:solidFill>
-              </a:rPr>
-              <a:t>You can add a new movie with detailed info – name, genre, ticket price etc. and it’s added to the data base </a:t>
-            </a:r>
-          </a:p>
-          <a:p>
-            <a:endParaRPr lang="en-US" sz="2000" dirty="0">
-              <a:solidFill>
-                <a:schemeClr val="accent1">
-                  <a:lumMod val="50000"/>
-                </a:schemeClr>
-              </a:solidFill>
-            </a:endParaRPr>
-          </a:p>
-          <a:p>
-            <a:r>
-              <a:rPr lang="en-US" sz="2000" dirty="0" smtClean="0">
-                <a:solidFill>
-                  <a:schemeClr val="accent1">
-                    <a:lumMod val="50000"/>
-                  </a:schemeClr>
-                </a:solidFill>
-              </a:rPr>
-              <a:t>Half of the charts work with the new movie  </a:t>
-            </a:r>
-          </a:p>
-          <a:p>
-            <a:endParaRPr lang="en-US" dirty="0"/>
           </a:p>
           <a:p>
             <a:endParaRPr lang="bg-BG" dirty="0"/>
@@ -5324,7 +5357,7 @@
     </p:spTree>
     <p:extLst>
       <p:ext uri="{BB962C8B-B14F-4D97-AF65-F5344CB8AC3E}">
-        <p14:creationId xmlns:p14="http://schemas.microsoft.com/office/powerpoint/2010/main" xmlns="" val="1978140734"/>
+        <p14:creationId xmlns="" xmlns:p14="http://schemas.microsoft.com/office/powerpoint/2010/main" val="1978140734"/>
       </p:ext>
     </p:extLst>
   </p:cSld>
@@ -6128,7 +6161,7 @@
     </p:spTree>
     <p:extLst>
       <p:ext uri="{BB962C8B-B14F-4D97-AF65-F5344CB8AC3E}">
-        <p14:creationId xmlns:p14="http://schemas.microsoft.com/office/powerpoint/2010/main" xmlns="" val="1284655973"/>
+        <p14:creationId xmlns="" xmlns:p14="http://schemas.microsoft.com/office/powerpoint/2010/main" val="1284655973"/>
       </p:ext>
     </p:extLst>
   </p:cSld>
@@ -6487,7 +6520,7 @@
     </p:spTree>
     <p:extLst>
       <p:ext uri="{BB962C8B-B14F-4D97-AF65-F5344CB8AC3E}">
-        <p14:creationId xmlns:p14="http://schemas.microsoft.com/office/powerpoint/2010/main" xmlns="" val="3004571794"/>
+        <p14:creationId xmlns="" xmlns:p14="http://schemas.microsoft.com/office/powerpoint/2010/main" val="3004571794"/>
       </p:ext>
     </p:extLst>
   </p:cSld>
@@ -6800,7 +6833,7 @@
     </p:spTree>
     <p:extLst>
       <p:ext uri="{BB962C8B-B14F-4D97-AF65-F5344CB8AC3E}">
-        <p14:creationId xmlns:p14="http://schemas.microsoft.com/office/powerpoint/2010/main" xmlns="" val="241372775"/>
+        <p14:creationId xmlns="" xmlns:p14="http://schemas.microsoft.com/office/powerpoint/2010/main" val="241372775"/>
       </p:ext>
     </p:extLst>
   </p:cSld>
@@ -6921,7 +6954,7 @@
     </p:spTree>
     <p:extLst>
       <p:ext uri="{BB962C8B-B14F-4D97-AF65-F5344CB8AC3E}">
-        <p14:creationId xmlns:p14="http://schemas.microsoft.com/office/powerpoint/2010/main" xmlns="" val="2020875122"/>
+        <p14:creationId xmlns="" xmlns:p14="http://schemas.microsoft.com/office/powerpoint/2010/main" val="2020875122"/>
       </p:ext>
     </p:extLst>
   </p:cSld>

</xml_diff>

<commit_message>
Presentation is updated with pyramid chart
</commit_message>
<xml_diff>
--- a/Project Documentation/Presentation Mandarine.pptx
+++ b/Project Documentation/Presentation Mandarine.pptx
@@ -369,7 +369,7 @@
     </p:spTree>
     <p:extLst>
       <p:ext uri="{BB962C8B-B14F-4D97-AF65-F5344CB8AC3E}">
-        <p14:creationId xmlns="" xmlns:p14="http://schemas.microsoft.com/office/powerpoint/2010/main" val="3915967036"/>
+        <p14:creationId xmlns:p14="http://schemas.microsoft.com/office/powerpoint/2010/main" xmlns="" val="3915967036"/>
       </p:ext>
     </p:extLst>
   </p:cSld>
@@ -544,7 +544,7 @@
     </p:spTree>
     <p:extLst>
       <p:ext uri="{BB962C8B-B14F-4D97-AF65-F5344CB8AC3E}">
-        <p14:creationId xmlns="" xmlns:p14="http://schemas.microsoft.com/office/powerpoint/2010/main" val="379079075"/>
+        <p14:creationId xmlns:p14="http://schemas.microsoft.com/office/powerpoint/2010/main" xmlns="" val="379079075"/>
       </p:ext>
     </p:extLst>
   </p:cSld>
@@ -629,7 +629,7 @@
     </p:spTree>
     <p:extLst>
       <p:ext uri="{BB962C8B-B14F-4D97-AF65-F5344CB8AC3E}">
-        <p14:creationId xmlns="" xmlns:p14="http://schemas.microsoft.com/office/powerpoint/2010/main" val="2747109784"/>
+        <p14:creationId xmlns:p14="http://schemas.microsoft.com/office/powerpoint/2010/main" xmlns="" val="2747109784"/>
       </p:ext>
     </p:extLst>
   </p:cSld>
@@ -873,7 +873,7 @@
     </p:spTree>
     <p:extLst>
       <p:ext uri="{BB962C8B-B14F-4D97-AF65-F5344CB8AC3E}">
-        <p14:creationId xmlns="" xmlns:p14="http://schemas.microsoft.com/office/powerpoint/2010/main" val="1365601116"/>
+        <p14:creationId xmlns:p14="http://schemas.microsoft.com/office/powerpoint/2010/main" xmlns="" val="1365601116"/>
       </p:ext>
     </p:extLst>
   </p:cSld>
@@ -1045,7 +1045,7 @@
     </p:spTree>
     <p:extLst>
       <p:ext uri="{BB962C8B-B14F-4D97-AF65-F5344CB8AC3E}">
-        <p14:creationId xmlns="" xmlns:p14="http://schemas.microsoft.com/office/powerpoint/2010/main" val="2307113976"/>
+        <p14:creationId xmlns:p14="http://schemas.microsoft.com/office/powerpoint/2010/main" xmlns="" val="2307113976"/>
       </p:ext>
     </p:extLst>
   </p:cSld>
@@ -1227,7 +1227,7 @@
     </p:spTree>
     <p:extLst>
       <p:ext uri="{BB962C8B-B14F-4D97-AF65-F5344CB8AC3E}">
-        <p14:creationId xmlns="" xmlns:p14="http://schemas.microsoft.com/office/powerpoint/2010/main" val="2924712174"/>
+        <p14:creationId xmlns:p14="http://schemas.microsoft.com/office/powerpoint/2010/main" xmlns="" val="2924712174"/>
       </p:ext>
     </p:extLst>
   </p:cSld>
@@ -1399,7 +1399,7 @@
     </p:spTree>
     <p:extLst>
       <p:ext uri="{BB962C8B-B14F-4D97-AF65-F5344CB8AC3E}">
-        <p14:creationId xmlns="" xmlns:p14="http://schemas.microsoft.com/office/powerpoint/2010/main" val="920667919"/>
+        <p14:creationId xmlns:p14="http://schemas.microsoft.com/office/powerpoint/2010/main" xmlns="" val="920667919"/>
       </p:ext>
     </p:extLst>
   </p:cSld>
@@ -1647,7 +1647,7 @@
     </p:spTree>
     <p:extLst>
       <p:ext uri="{BB962C8B-B14F-4D97-AF65-F5344CB8AC3E}">
-        <p14:creationId xmlns="" xmlns:p14="http://schemas.microsoft.com/office/powerpoint/2010/main" val="2518805200"/>
+        <p14:creationId xmlns:p14="http://schemas.microsoft.com/office/powerpoint/2010/main" xmlns="" val="2518805200"/>
       </p:ext>
     </p:extLst>
   </p:cSld>
@@ -1937,7 +1937,7 @@
     </p:spTree>
     <p:extLst>
       <p:ext uri="{BB962C8B-B14F-4D97-AF65-F5344CB8AC3E}">
-        <p14:creationId xmlns="" xmlns:p14="http://schemas.microsoft.com/office/powerpoint/2010/main" val="1671547278"/>
+        <p14:creationId xmlns:p14="http://schemas.microsoft.com/office/powerpoint/2010/main" xmlns="" val="1671547278"/>
       </p:ext>
     </p:extLst>
   </p:cSld>
@@ -2361,7 +2361,7 @@
     </p:spTree>
     <p:extLst>
       <p:ext uri="{BB962C8B-B14F-4D97-AF65-F5344CB8AC3E}">
-        <p14:creationId xmlns="" xmlns:p14="http://schemas.microsoft.com/office/powerpoint/2010/main" val="2359131444"/>
+        <p14:creationId xmlns:p14="http://schemas.microsoft.com/office/powerpoint/2010/main" xmlns="" val="2359131444"/>
       </p:ext>
     </p:extLst>
   </p:cSld>
@@ -2481,7 +2481,7 @@
     </p:spTree>
     <p:extLst>
       <p:ext uri="{BB962C8B-B14F-4D97-AF65-F5344CB8AC3E}">
-        <p14:creationId xmlns="" xmlns:p14="http://schemas.microsoft.com/office/powerpoint/2010/main" val="1701070066"/>
+        <p14:creationId xmlns:p14="http://schemas.microsoft.com/office/powerpoint/2010/main" xmlns="" val="1701070066"/>
       </p:ext>
     </p:extLst>
   </p:cSld>
@@ -2578,7 +2578,7 @@
     </p:spTree>
     <p:extLst>
       <p:ext uri="{BB962C8B-B14F-4D97-AF65-F5344CB8AC3E}">
-        <p14:creationId xmlns="" xmlns:p14="http://schemas.microsoft.com/office/powerpoint/2010/main" val="1206239005"/>
+        <p14:creationId xmlns:p14="http://schemas.microsoft.com/office/powerpoint/2010/main" xmlns="" val="1206239005"/>
       </p:ext>
     </p:extLst>
   </p:cSld>
@@ -2857,7 +2857,7 @@
     </p:spTree>
     <p:extLst>
       <p:ext uri="{BB962C8B-B14F-4D97-AF65-F5344CB8AC3E}">
-        <p14:creationId xmlns="" xmlns:p14="http://schemas.microsoft.com/office/powerpoint/2010/main" val="2089640843"/>
+        <p14:creationId xmlns:p14="http://schemas.microsoft.com/office/powerpoint/2010/main" xmlns="" val="2089640843"/>
       </p:ext>
     </p:extLst>
   </p:cSld>
@@ -3112,7 +3112,7 @@
     </p:spTree>
     <p:extLst>
       <p:ext uri="{BB962C8B-B14F-4D97-AF65-F5344CB8AC3E}">
-        <p14:creationId xmlns="" xmlns:p14="http://schemas.microsoft.com/office/powerpoint/2010/main" val="1915928661"/>
+        <p14:creationId xmlns:p14="http://schemas.microsoft.com/office/powerpoint/2010/main" xmlns="" val="1915928661"/>
       </p:ext>
     </p:extLst>
   </p:cSld>
@@ -3372,7 +3372,7 @@
     </p:spTree>
     <p:extLst>
       <p:ext uri="{BB962C8B-B14F-4D97-AF65-F5344CB8AC3E}">
-        <p14:creationId xmlns="" xmlns:p14="http://schemas.microsoft.com/office/powerpoint/2010/main" val="3313188243"/>
+        <p14:creationId xmlns:p14="http://schemas.microsoft.com/office/powerpoint/2010/main" xmlns="" val="3313188243"/>
       </p:ext>
     </p:extLst>
   </p:cSld>
@@ -3990,7 +3990,7 @@
     </p:spTree>
     <p:extLst>
       <p:ext uri="{BB962C8B-B14F-4D97-AF65-F5344CB8AC3E}">
-        <p14:creationId xmlns="" xmlns:p14="http://schemas.microsoft.com/office/powerpoint/2010/main" val="3556372192"/>
+        <p14:creationId xmlns:p14="http://schemas.microsoft.com/office/powerpoint/2010/main" xmlns="" val="3556372192"/>
       </p:ext>
     </p:extLst>
   </p:cSld>
@@ -4277,7 +4277,7 @@
           <p:nvPr>
             <p:extLst>
               <p:ext uri="{D42A27DB-BD31-4B8C-83A1-F6EECF244321}">
-                <p14:modId xmlns="" xmlns:p14="http://schemas.microsoft.com/office/powerpoint/2010/main" val="193443960"/>
+                <p14:modId xmlns:p14="http://schemas.microsoft.com/office/powerpoint/2010/main" xmlns="" val="193443960"/>
               </p:ext>
             </p:extLst>
           </p:nvPr>
@@ -4724,7 +4724,7 @@
     </p:spTree>
     <p:extLst>
       <p:ext uri="{BB962C8B-B14F-4D97-AF65-F5344CB8AC3E}">
-        <p14:creationId xmlns="" xmlns:p14="http://schemas.microsoft.com/office/powerpoint/2010/main" val="3929209132"/>
+        <p14:creationId xmlns:p14="http://schemas.microsoft.com/office/powerpoint/2010/main" xmlns="" val="3929209132"/>
       </p:ext>
     </p:extLst>
   </p:cSld>
@@ -5086,7 +5086,7 @@
     </p:spTree>
     <p:extLst>
       <p:ext uri="{BB962C8B-B14F-4D97-AF65-F5344CB8AC3E}">
-        <p14:creationId xmlns="" xmlns:p14="http://schemas.microsoft.com/office/powerpoint/2010/main" val="4207131649"/>
+        <p14:creationId xmlns:p14="http://schemas.microsoft.com/office/powerpoint/2010/main" xmlns="" val="4207131649"/>
       </p:ext>
     </p:extLst>
   </p:cSld>
@@ -5194,13 +5194,6 @@
               </a:rPr>
               <a:t>The app: </a:t>
             </a:r>
-            <a:endParaRPr lang="en-US" sz="2000" b="1" dirty="0" smtClean="0">
-              <a:solidFill>
-                <a:schemeClr val="accent1">
-                  <a:lumMod val="50000"/>
-                </a:schemeClr>
-              </a:solidFill>
-            </a:endParaRPr>
           </a:p>
           <a:p>
             <a:endParaRPr lang="en-US" sz="2000" dirty="0">
@@ -5357,7 +5350,7 @@
     </p:spTree>
     <p:extLst>
       <p:ext uri="{BB962C8B-B14F-4D97-AF65-F5344CB8AC3E}">
-        <p14:creationId xmlns="" xmlns:p14="http://schemas.microsoft.com/office/powerpoint/2010/main" val="1978140734"/>
+        <p14:creationId xmlns:p14="http://schemas.microsoft.com/office/powerpoint/2010/main" xmlns="" val="1978140734"/>
       </p:ext>
     </p:extLst>
   </p:cSld>
@@ -6107,11 +6100,15 @@
                       </a:pPr>
                       <a:r>
                         <a:rPr lang="en-US" dirty="0" smtClean="0"/>
-                        <a:t>ticket price, </a:t>
-                      </a:r>
-                      <a:r>
-                        <a:rPr lang="en-US" baseline="0" dirty="0" smtClean="0"/>
-                        <a:t>works with its own data </a:t>
+                        <a:t>ticket price</a:t>
+                      </a:r>
+                      <a:r>
+                        <a:rPr lang="en-US" smtClean="0"/>
+                        <a:t>, </a:t>
+                      </a:r>
+                      <a:r>
+                        <a:rPr lang="en-US" baseline="0" smtClean="0"/>
+                        <a:t>works with database and new added movies</a:t>
                       </a:r>
                       <a:endParaRPr lang="bg-BG" dirty="0" smtClean="0"/>
                     </a:p>
@@ -6161,7 +6158,7 @@
     </p:spTree>
     <p:extLst>
       <p:ext uri="{BB962C8B-B14F-4D97-AF65-F5344CB8AC3E}">
-        <p14:creationId xmlns="" xmlns:p14="http://schemas.microsoft.com/office/powerpoint/2010/main" val="1284655973"/>
+        <p14:creationId xmlns:p14="http://schemas.microsoft.com/office/powerpoint/2010/main" xmlns="" val="1284655973"/>
       </p:ext>
     </p:extLst>
   </p:cSld>
@@ -6520,7 +6517,7 @@
     </p:spTree>
     <p:extLst>
       <p:ext uri="{BB962C8B-B14F-4D97-AF65-F5344CB8AC3E}">
-        <p14:creationId xmlns="" xmlns:p14="http://schemas.microsoft.com/office/powerpoint/2010/main" val="3004571794"/>
+        <p14:creationId xmlns:p14="http://schemas.microsoft.com/office/powerpoint/2010/main" xmlns="" val="3004571794"/>
       </p:ext>
     </p:extLst>
   </p:cSld>
@@ -6833,7 +6830,7 @@
     </p:spTree>
     <p:extLst>
       <p:ext uri="{BB962C8B-B14F-4D97-AF65-F5344CB8AC3E}">
-        <p14:creationId xmlns="" xmlns:p14="http://schemas.microsoft.com/office/powerpoint/2010/main" val="241372775"/>
+        <p14:creationId xmlns:p14="http://schemas.microsoft.com/office/powerpoint/2010/main" xmlns="" val="241372775"/>
       </p:ext>
     </p:extLst>
   </p:cSld>
@@ -6954,7 +6951,7 @@
     </p:spTree>
     <p:extLst>
       <p:ext uri="{BB962C8B-B14F-4D97-AF65-F5344CB8AC3E}">
-        <p14:creationId xmlns="" xmlns:p14="http://schemas.microsoft.com/office/powerpoint/2010/main" val="2020875122"/>
+        <p14:creationId xmlns:p14="http://schemas.microsoft.com/office/powerpoint/2010/main" xmlns="" val="2020875122"/>
       </p:ext>
     </p:extLst>
   </p:cSld>

</xml_diff>